<commit_message>
FINAL - Pós apresentação
</commit_message>
<xml_diff>
--- a/Documentação/PPT/Apresentação - LOL.pptx
+++ b/Documentação/PPT/Apresentação - LOL.pptx
@@ -14,12 +14,13 @@
     <p:sldId id="263" r:id="rId8"/>
     <p:sldId id="264" r:id="rId9"/>
     <p:sldId id="278" r:id="rId10"/>
-    <p:sldId id="265" r:id="rId11"/>
-    <p:sldId id="258" r:id="rId12"/>
-    <p:sldId id="259" r:id="rId13"/>
-    <p:sldId id="273" r:id="rId14"/>
-    <p:sldId id="274" r:id="rId15"/>
-    <p:sldId id="269" r:id="rId16"/>
+    <p:sldId id="279" r:id="rId11"/>
+    <p:sldId id="265" r:id="rId12"/>
+    <p:sldId id="258" r:id="rId13"/>
+    <p:sldId id="259" r:id="rId14"/>
+    <p:sldId id="273" r:id="rId15"/>
+    <p:sldId id="274" r:id="rId16"/>
+    <p:sldId id="269" r:id="rId17"/>
   </p:sldIdLst>
   <p:sldSz cx="12192000" cy="6858000"/>
   <p:notesSz cx="6858000" cy="9144000"/>
@@ -257,7 +258,7 @@
           <a:p>
             <a:fld id="{BA38CAE6-00E2-47BE-AE59-ACD9E0805BDA}" type="datetimeFigureOut">
               <a:rPr lang="pt-BR" smtClean="0"/>
-              <a:t>07/06/2021</a:t>
+              <a:t>09/06/2021</a:t>
             </a:fld>
             <a:endParaRPr lang="pt-BR"/>
           </a:p>
@@ -427,7 +428,7 @@
           <a:p>
             <a:fld id="{BA38CAE6-00E2-47BE-AE59-ACD9E0805BDA}" type="datetimeFigureOut">
               <a:rPr lang="pt-BR" smtClean="0"/>
-              <a:t>07/06/2021</a:t>
+              <a:t>09/06/2021</a:t>
             </a:fld>
             <a:endParaRPr lang="pt-BR"/>
           </a:p>
@@ -607,7 +608,7 @@
           <a:p>
             <a:fld id="{BA38CAE6-00E2-47BE-AE59-ACD9E0805BDA}" type="datetimeFigureOut">
               <a:rPr lang="pt-BR" smtClean="0"/>
-              <a:t>07/06/2021</a:t>
+              <a:t>09/06/2021</a:t>
             </a:fld>
             <a:endParaRPr lang="pt-BR"/>
           </a:p>
@@ -777,7 +778,7 @@
           <a:p>
             <a:fld id="{BA38CAE6-00E2-47BE-AE59-ACD9E0805BDA}" type="datetimeFigureOut">
               <a:rPr lang="pt-BR" smtClean="0"/>
-              <a:t>07/06/2021</a:t>
+              <a:t>09/06/2021</a:t>
             </a:fld>
             <a:endParaRPr lang="pt-BR"/>
           </a:p>
@@ -1023,7 +1024,7 @@
           <a:p>
             <a:fld id="{BA38CAE6-00E2-47BE-AE59-ACD9E0805BDA}" type="datetimeFigureOut">
               <a:rPr lang="pt-BR" smtClean="0"/>
-              <a:t>07/06/2021</a:t>
+              <a:t>09/06/2021</a:t>
             </a:fld>
             <a:endParaRPr lang="pt-BR"/>
           </a:p>
@@ -1255,7 +1256,7 @@
           <a:p>
             <a:fld id="{BA38CAE6-00E2-47BE-AE59-ACD9E0805BDA}" type="datetimeFigureOut">
               <a:rPr lang="pt-BR" smtClean="0"/>
-              <a:t>07/06/2021</a:t>
+              <a:t>09/06/2021</a:t>
             </a:fld>
             <a:endParaRPr lang="pt-BR"/>
           </a:p>
@@ -1622,7 +1623,7 @@
           <a:p>
             <a:fld id="{BA38CAE6-00E2-47BE-AE59-ACD9E0805BDA}" type="datetimeFigureOut">
               <a:rPr lang="pt-BR" smtClean="0"/>
-              <a:t>07/06/2021</a:t>
+              <a:t>09/06/2021</a:t>
             </a:fld>
             <a:endParaRPr lang="pt-BR"/>
           </a:p>
@@ -1740,7 +1741,7 @@
           <a:p>
             <a:fld id="{BA38CAE6-00E2-47BE-AE59-ACD9E0805BDA}" type="datetimeFigureOut">
               <a:rPr lang="pt-BR" smtClean="0"/>
-              <a:t>07/06/2021</a:t>
+              <a:t>09/06/2021</a:t>
             </a:fld>
             <a:endParaRPr lang="pt-BR"/>
           </a:p>
@@ -1835,7 +1836,7 @@
           <a:p>
             <a:fld id="{BA38CAE6-00E2-47BE-AE59-ACD9E0805BDA}" type="datetimeFigureOut">
               <a:rPr lang="pt-BR" smtClean="0"/>
-              <a:t>07/06/2021</a:t>
+              <a:t>09/06/2021</a:t>
             </a:fld>
             <a:endParaRPr lang="pt-BR"/>
           </a:p>
@@ -2112,7 +2113,7 @@
           <a:p>
             <a:fld id="{BA38CAE6-00E2-47BE-AE59-ACD9E0805BDA}" type="datetimeFigureOut">
               <a:rPr lang="pt-BR" smtClean="0"/>
-              <a:t>07/06/2021</a:t>
+              <a:t>09/06/2021</a:t>
             </a:fld>
             <a:endParaRPr lang="pt-BR"/>
           </a:p>
@@ -2365,7 +2366,7 @@
           <a:p>
             <a:fld id="{BA38CAE6-00E2-47BE-AE59-ACD9E0805BDA}" type="datetimeFigureOut">
               <a:rPr lang="pt-BR" smtClean="0"/>
-              <a:t>07/06/2021</a:t>
+              <a:t>09/06/2021</a:t>
             </a:fld>
             <a:endParaRPr lang="pt-BR"/>
           </a:p>
@@ -2578,7 +2579,7 @@
           <a:p>
             <a:fld id="{BA38CAE6-00E2-47BE-AE59-ACD9E0805BDA}" type="datetimeFigureOut">
               <a:rPr lang="pt-BR" smtClean="0"/>
-              <a:t>07/06/2021</a:t>
+              <a:t>09/06/2021</a:t>
             </a:fld>
             <a:endParaRPr lang="pt-BR"/>
           </a:p>
@@ -5668,6 +5669,648 @@
           <a:chExt cx="0" cy="0"/>
         </a:xfrm>
       </p:grpSpPr>
+      <p:sp>
+        <p:nvSpPr>
+          <p:cNvPr id="8" name="Retângulo"/>
+          <p:cNvSpPr/>
+          <p:nvPr/>
+        </p:nvSpPr>
+        <p:spPr>
+          <a:xfrm>
+            <a:off x="2438399" y="497696"/>
+            <a:ext cx="10624458" cy="1781270"/>
+          </a:xfrm>
+          <a:prstGeom prst="rect">
+            <a:avLst/>
+          </a:prstGeom>
+          <a:noFill/>
+          <a:ln w="76200">
+            <a:gradFill flip="none" rotWithShape="1">
+              <a:gsLst>
+                <a:gs pos="0">
+                  <a:srgbClr val="4BCBB9"/>
+                </a:gs>
+                <a:gs pos="100000">
+                  <a:schemeClr val="accent1">
+                    <a:lumMod val="30000"/>
+                    <a:lumOff val="70000"/>
+                  </a:schemeClr>
+                </a:gs>
+              </a:gsLst>
+              <a:lin ang="0" scaled="1"/>
+              <a:tileRect/>
+            </a:gradFill>
+          </a:ln>
+        </p:spPr>
+        <p:style>
+          <a:lnRef idx="2">
+            <a:schemeClr val="accent1">
+              <a:shade val="50000"/>
+            </a:schemeClr>
+          </a:lnRef>
+          <a:fillRef idx="1">
+            <a:schemeClr val="accent1"/>
+          </a:fillRef>
+          <a:effectRef idx="0">
+            <a:schemeClr val="accent1"/>
+          </a:effectRef>
+          <a:fontRef idx="minor">
+            <a:schemeClr val="lt1"/>
+          </a:fontRef>
+        </p:style>
+        <p:txBody>
+          <a:bodyPr rtlCol="0" anchor="ctr"/>
+          <a:lstStyle/>
+          <a:p>
+            <a:pPr algn="ctr"/>
+            <a:endParaRPr lang="pt-BR"/>
+          </a:p>
+        </p:txBody>
+      </p:sp>
+      <p:sp>
+        <p:nvSpPr>
+          <p:cNvPr id="9" name="LEAGUE OF LEGENDS"/>
+          <p:cNvSpPr txBox="1"/>
+          <p:nvPr/>
+        </p:nvSpPr>
+        <p:spPr>
+          <a:xfrm>
+            <a:off x="3169383" y="972832"/>
+            <a:ext cx="7750294" cy="830997"/>
+          </a:xfrm>
+          <a:prstGeom prst="rect">
+            <a:avLst/>
+          </a:prstGeom>
+          <a:noFill/>
+        </p:spPr>
+        <p:txBody>
+          <a:bodyPr wrap="square" rtlCol="0">
+            <a:spAutoFit/>
+          </a:bodyPr>
+          <a:lstStyle/>
+          <a:p>
+            <a:r>
+              <a:rPr lang="pt-BR" sz="4800" dirty="0" smtClean="0">
+                <a:solidFill>
+                  <a:schemeClr val="bg1"/>
+                </a:solidFill>
+              </a:rPr>
+              <a:t>Métrica de dados por idade</a:t>
+            </a:r>
+            <a:endParaRPr lang="pt-BR" sz="4800" dirty="0">
+              <a:solidFill>
+                <a:schemeClr val="bg1"/>
+              </a:solidFill>
+            </a:endParaRPr>
+          </a:p>
+        </p:txBody>
+      </p:sp>
+      <p:pic>
+        <p:nvPicPr>
+          <p:cNvPr id="4" name="Imagem 3"/>
+          <p:cNvPicPr>
+            <a:picLocks noChangeAspect="1"/>
+          </p:cNvPicPr>
+          <p:nvPr/>
+        </p:nvPicPr>
+        <p:blipFill>
+          <a:blip r:embed="rId3"/>
+          <a:stretch>
+            <a:fillRect/>
+          </a:stretch>
+        </p:blipFill>
+        <p:spPr>
+          <a:xfrm>
+            <a:off x="2958904" y="2537628"/>
+            <a:ext cx="6548847" cy="4129160"/>
+          </a:xfrm>
+          <a:prstGeom prst="rect">
+            <a:avLst/>
+          </a:prstGeom>
+        </p:spPr>
+      </p:pic>
+    </p:spTree>
+    <p:extLst>
+      <p:ext uri="{BB962C8B-B14F-4D97-AF65-F5344CB8AC3E}">
+        <p14:creationId xmlns:p14="http://schemas.microsoft.com/office/powerpoint/2010/main" val="1931561185"/>
+      </p:ext>
+    </p:extLst>
+  </p:cSld>
+  <p:clrMapOvr>
+    <a:masterClrMapping/>
+  </p:clrMapOvr>
+  <mc:AlternateContent xmlns:mc="http://schemas.openxmlformats.org/markup-compatibility/2006">
+    <mc:Choice xmlns:p14="http://schemas.microsoft.com/office/powerpoint/2010/main" Requires="p14">
+      <p:timing>
+        <p:tnLst>
+          <p:par>
+            <p:cTn id="1" dur="indefinite" restart="never" nodeType="tmRoot">
+              <p:childTnLst>
+                <p:seq concurrent="1" nextAc="seek">
+                  <p:cTn id="2" dur="indefinite" nodeType="mainSeq">
+                    <p:childTnLst>
+                      <p:par>
+                        <p:cTn id="3" fill="hold">
+                          <p:stCondLst>
+                            <p:cond delay="indefinite"/>
+                            <p:cond evt="onBegin" delay="0">
+                              <p:tn val="2"/>
+                            </p:cond>
+                          </p:stCondLst>
+                          <p:childTnLst>
+                            <p:par>
+                              <p:cTn id="4" fill="hold">
+                                <p:stCondLst>
+                                  <p:cond delay="0"/>
+                                </p:stCondLst>
+                                <p:childTnLst>
+                                  <p:par>
+                                    <p:cTn id="5" presetID="2" presetClass="entr" presetSubtype="2" fill="hold" grpId="0" nodeType="withEffect" p14:presetBounceEnd="30000">
+                                      <p:stCondLst>
+                                        <p:cond delay="300"/>
+                                      </p:stCondLst>
+                                      <p:childTnLst>
+                                        <p:set>
+                                          <p:cBhvr>
+                                            <p:cTn id="6" dur="1" fill="hold">
+                                              <p:stCondLst>
+                                                <p:cond delay="0"/>
+                                              </p:stCondLst>
+                                            </p:cTn>
+                                            <p:tgtEl>
+                                              <p:spTgt spid="8"/>
+                                            </p:tgtEl>
+                                            <p:attrNameLst>
+                                              <p:attrName>style.visibility</p:attrName>
+                                            </p:attrNameLst>
+                                          </p:cBhvr>
+                                          <p:to>
+                                            <p:strVal val="visible"/>
+                                          </p:to>
+                                        </p:set>
+                                        <p:anim calcmode="lin" valueType="num" p14:bounceEnd="30000">
+                                          <p:cBhvr additive="base">
+                                            <p:cTn id="7" dur="500" fill="hold"/>
+                                            <p:tgtEl>
+                                              <p:spTgt spid="8"/>
+                                            </p:tgtEl>
+                                            <p:attrNameLst>
+                                              <p:attrName>ppt_x</p:attrName>
+                                            </p:attrNameLst>
+                                          </p:cBhvr>
+                                          <p:tavLst>
+                                            <p:tav tm="0">
+                                              <p:val>
+                                                <p:strVal val="1+#ppt_w/2"/>
+                                              </p:val>
+                                            </p:tav>
+                                            <p:tav tm="100000">
+                                              <p:val>
+                                                <p:strVal val="#ppt_x"/>
+                                              </p:val>
+                                            </p:tav>
+                                          </p:tavLst>
+                                        </p:anim>
+                                        <p:anim calcmode="lin" valueType="num" p14:bounceEnd="30000">
+                                          <p:cBhvr additive="base">
+                                            <p:cTn id="8" dur="500" fill="hold"/>
+                                            <p:tgtEl>
+                                              <p:spTgt spid="8"/>
+                                            </p:tgtEl>
+                                            <p:attrNameLst>
+                                              <p:attrName>ppt_y</p:attrName>
+                                            </p:attrNameLst>
+                                          </p:cBhvr>
+                                          <p:tavLst>
+                                            <p:tav tm="0">
+                                              <p:val>
+                                                <p:strVal val="#ppt_y"/>
+                                              </p:val>
+                                            </p:tav>
+                                            <p:tav tm="100000">
+                                              <p:val>
+                                                <p:strVal val="#ppt_y"/>
+                                              </p:val>
+                                            </p:tav>
+                                          </p:tavLst>
+                                        </p:anim>
+                                      </p:childTnLst>
+                                    </p:cTn>
+                                  </p:par>
+                                  <p:par>
+                                    <p:cTn id="9" presetID="22" presetClass="entr" presetSubtype="8" fill="hold" grpId="0" nodeType="withEffect">
+                                      <p:stCondLst>
+                                        <p:cond delay="700"/>
+                                      </p:stCondLst>
+                                      <p:childTnLst>
+                                        <p:set>
+                                          <p:cBhvr>
+                                            <p:cTn id="10" dur="1" fill="hold">
+                                              <p:stCondLst>
+                                                <p:cond delay="0"/>
+                                              </p:stCondLst>
+                                            </p:cTn>
+                                            <p:tgtEl>
+                                              <p:spTgt spid="9"/>
+                                            </p:tgtEl>
+                                            <p:attrNameLst>
+                                              <p:attrName>style.visibility</p:attrName>
+                                            </p:attrNameLst>
+                                          </p:cBhvr>
+                                          <p:to>
+                                            <p:strVal val="visible"/>
+                                          </p:to>
+                                        </p:set>
+                                        <p:animEffect transition="in" filter="wipe(left)">
+                                          <p:cBhvr>
+                                            <p:cTn id="11" dur="500"/>
+                                            <p:tgtEl>
+                                              <p:spTgt spid="9"/>
+                                            </p:tgtEl>
+                                          </p:cBhvr>
+                                        </p:animEffect>
+                                      </p:childTnLst>
+                                    </p:cTn>
+                                  </p:par>
+                                  <p:par>
+                                    <p:cTn id="12" presetID="2" presetClass="entr" presetSubtype="4" fill="hold" nodeType="withEffect">
+                                      <p:stCondLst>
+                                        <p:cond delay="1200"/>
+                                      </p:stCondLst>
+                                      <p:childTnLst>
+                                        <p:set>
+                                          <p:cBhvr>
+                                            <p:cTn id="13" dur="1" fill="hold">
+                                              <p:stCondLst>
+                                                <p:cond delay="0"/>
+                                              </p:stCondLst>
+                                            </p:cTn>
+                                            <p:tgtEl>
+                                              <p:spTgt spid="4"/>
+                                            </p:tgtEl>
+                                            <p:attrNameLst>
+                                              <p:attrName>style.visibility</p:attrName>
+                                            </p:attrNameLst>
+                                          </p:cBhvr>
+                                          <p:to>
+                                            <p:strVal val="visible"/>
+                                          </p:to>
+                                        </p:set>
+                                        <p:anim calcmode="lin" valueType="num">
+                                          <p:cBhvr additive="base">
+                                            <p:cTn id="14" dur="500" fill="hold"/>
+                                            <p:tgtEl>
+                                              <p:spTgt spid="4"/>
+                                            </p:tgtEl>
+                                            <p:attrNameLst>
+                                              <p:attrName>ppt_x</p:attrName>
+                                            </p:attrNameLst>
+                                          </p:cBhvr>
+                                          <p:tavLst>
+                                            <p:tav tm="0">
+                                              <p:val>
+                                                <p:strVal val="#ppt_x"/>
+                                              </p:val>
+                                            </p:tav>
+                                            <p:tav tm="100000">
+                                              <p:val>
+                                                <p:strVal val="#ppt_x"/>
+                                              </p:val>
+                                            </p:tav>
+                                          </p:tavLst>
+                                        </p:anim>
+                                        <p:anim calcmode="lin" valueType="num">
+                                          <p:cBhvr additive="base">
+                                            <p:cTn id="15" dur="500" fill="hold"/>
+                                            <p:tgtEl>
+                                              <p:spTgt spid="4"/>
+                                            </p:tgtEl>
+                                            <p:attrNameLst>
+                                              <p:attrName>ppt_y</p:attrName>
+                                            </p:attrNameLst>
+                                          </p:cBhvr>
+                                          <p:tavLst>
+                                            <p:tav tm="0">
+                                              <p:val>
+                                                <p:strVal val="1+#ppt_h/2"/>
+                                              </p:val>
+                                            </p:tav>
+                                            <p:tav tm="100000">
+                                              <p:val>
+                                                <p:strVal val="#ppt_y"/>
+                                              </p:val>
+                                            </p:tav>
+                                          </p:tavLst>
+                                        </p:anim>
+                                      </p:childTnLst>
+                                    </p:cTn>
+                                  </p:par>
+                                </p:childTnLst>
+                              </p:cTn>
+                            </p:par>
+                          </p:childTnLst>
+                        </p:cTn>
+                      </p:par>
+                    </p:childTnLst>
+                  </p:cTn>
+                  <p:prevCondLst>
+                    <p:cond evt="onPrev" delay="0">
+                      <p:tgtEl>
+                        <p:sldTgt/>
+                      </p:tgtEl>
+                    </p:cond>
+                  </p:prevCondLst>
+                  <p:nextCondLst>
+                    <p:cond evt="onNext" delay="0">
+                      <p:tgtEl>
+                        <p:sldTgt/>
+                      </p:tgtEl>
+                    </p:cond>
+                  </p:nextCondLst>
+                </p:seq>
+              </p:childTnLst>
+            </p:cTn>
+          </p:par>
+        </p:tnLst>
+        <p:bldLst>
+          <p:bldP spid="8" grpId="0" animBg="1"/>
+          <p:bldP spid="9" grpId="0"/>
+        </p:bldLst>
+      </p:timing>
+    </mc:Choice>
+    <mc:Fallback>
+      <p:timing>
+        <p:tnLst>
+          <p:par>
+            <p:cTn id="1" dur="indefinite" restart="never" nodeType="tmRoot">
+              <p:childTnLst>
+                <p:seq concurrent="1" nextAc="seek">
+                  <p:cTn id="2" dur="indefinite" nodeType="mainSeq">
+                    <p:childTnLst>
+                      <p:par>
+                        <p:cTn id="3" fill="hold">
+                          <p:stCondLst>
+                            <p:cond delay="indefinite"/>
+                            <p:cond evt="onBegin" delay="0">
+                              <p:tn val="2"/>
+                            </p:cond>
+                          </p:stCondLst>
+                          <p:childTnLst>
+                            <p:par>
+                              <p:cTn id="4" fill="hold">
+                                <p:stCondLst>
+                                  <p:cond delay="0"/>
+                                </p:stCondLst>
+                                <p:childTnLst>
+                                  <p:par>
+                                    <p:cTn id="5" presetID="2" presetClass="entr" presetSubtype="2" fill="hold" grpId="0" nodeType="withEffect">
+                                      <p:stCondLst>
+                                        <p:cond delay="300"/>
+                                      </p:stCondLst>
+                                      <p:childTnLst>
+                                        <p:set>
+                                          <p:cBhvr>
+                                            <p:cTn id="6" dur="1" fill="hold">
+                                              <p:stCondLst>
+                                                <p:cond delay="0"/>
+                                              </p:stCondLst>
+                                            </p:cTn>
+                                            <p:tgtEl>
+                                              <p:spTgt spid="8"/>
+                                            </p:tgtEl>
+                                            <p:attrNameLst>
+                                              <p:attrName>style.visibility</p:attrName>
+                                            </p:attrNameLst>
+                                          </p:cBhvr>
+                                          <p:to>
+                                            <p:strVal val="visible"/>
+                                          </p:to>
+                                        </p:set>
+                                        <p:anim calcmode="lin" valueType="num">
+                                          <p:cBhvr additive="base">
+                                            <p:cTn id="7" dur="500" fill="hold"/>
+                                            <p:tgtEl>
+                                              <p:spTgt spid="8"/>
+                                            </p:tgtEl>
+                                            <p:attrNameLst>
+                                              <p:attrName>ppt_x</p:attrName>
+                                            </p:attrNameLst>
+                                          </p:cBhvr>
+                                          <p:tavLst>
+                                            <p:tav tm="0">
+                                              <p:val>
+                                                <p:strVal val="1+#ppt_w/2"/>
+                                              </p:val>
+                                            </p:tav>
+                                            <p:tav tm="100000">
+                                              <p:val>
+                                                <p:strVal val="#ppt_x"/>
+                                              </p:val>
+                                            </p:tav>
+                                          </p:tavLst>
+                                        </p:anim>
+                                        <p:anim calcmode="lin" valueType="num">
+                                          <p:cBhvr additive="base">
+                                            <p:cTn id="8" dur="500" fill="hold"/>
+                                            <p:tgtEl>
+                                              <p:spTgt spid="8"/>
+                                            </p:tgtEl>
+                                            <p:attrNameLst>
+                                              <p:attrName>ppt_y</p:attrName>
+                                            </p:attrNameLst>
+                                          </p:cBhvr>
+                                          <p:tavLst>
+                                            <p:tav tm="0">
+                                              <p:val>
+                                                <p:strVal val="#ppt_y"/>
+                                              </p:val>
+                                            </p:tav>
+                                            <p:tav tm="100000">
+                                              <p:val>
+                                                <p:strVal val="#ppt_y"/>
+                                              </p:val>
+                                            </p:tav>
+                                          </p:tavLst>
+                                        </p:anim>
+                                      </p:childTnLst>
+                                    </p:cTn>
+                                  </p:par>
+                                  <p:par>
+                                    <p:cTn id="9" presetID="22" presetClass="entr" presetSubtype="8" fill="hold" grpId="0" nodeType="withEffect">
+                                      <p:stCondLst>
+                                        <p:cond delay="700"/>
+                                      </p:stCondLst>
+                                      <p:childTnLst>
+                                        <p:set>
+                                          <p:cBhvr>
+                                            <p:cTn id="10" dur="1" fill="hold">
+                                              <p:stCondLst>
+                                                <p:cond delay="0"/>
+                                              </p:stCondLst>
+                                            </p:cTn>
+                                            <p:tgtEl>
+                                              <p:spTgt spid="9"/>
+                                            </p:tgtEl>
+                                            <p:attrNameLst>
+                                              <p:attrName>style.visibility</p:attrName>
+                                            </p:attrNameLst>
+                                          </p:cBhvr>
+                                          <p:to>
+                                            <p:strVal val="visible"/>
+                                          </p:to>
+                                        </p:set>
+                                        <p:animEffect transition="in" filter="wipe(left)">
+                                          <p:cBhvr>
+                                            <p:cTn id="11" dur="500"/>
+                                            <p:tgtEl>
+                                              <p:spTgt spid="9"/>
+                                            </p:tgtEl>
+                                          </p:cBhvr>
+                                        </p:animEffect>
+                                      </p:childTnLst>
+                                    </p:cTn>
+                                  </p:par>
+                                  <p:par>
+                                    <p:cTn id="12" presetID="2" presetClass="entr" presetSubtype="4" fill="hold" nodeType="withEffect">
+                                      <p:stCondLst>
+                                        <p:cond delay="1200"/>
+                                      </p:stCondLst>
+                                      <p:childTnLst>
+                                        <p:set>
+                                          <p:cBhvr>
+                                            <p:cTn id="13" dur="1" fill="hold">
+                                              <p:stCondLst>
+                                                <p:cond delay="0"/>
+                                              </p:stCondLst>
+                                            </p:cTn>
+                                            <p:tgtEl>
+                                              <p:spTgt spid="4"/>
+                                            </p:tgtEl>
+                                            <p:attrNameLst>
+                                              <p:attrName>style.visibility</p:attrName>
+                                            </p:attrNameLst>
+                                          </p:cBhvr>
+                                          <p:to>
+                                            <p:strVal val="visible"/>
+                                          </p:to>
+                                        </p:set>
+                                        <p:anim calcmode="lin" valueType="num">
+                                          <p:cBhvr additive="base">
+                                            <p:cTn id="14" dur="500" fill="hold"/>
+                                            <p:tgtEl>
+                                              <p:spTgt spid="4"/>
+                                            </p:tgtEl>
+                                            <p:attrNameLst>
+                                              <p:attrName>ppt_x</p:attrName>
+                                            </p:attrNameLst>
+                                          </p:cBhvr>
+                                          <p:tavLst>
+                                            <p:tav tm="0">
+                                              <p:val>
+                                                <p:strVal val="#ppt_x"/>
+                                              </p:val>
+                                            </p:tav>
+                                            <p:tav tm="100000">
+                                              <p:val>
+                                                <p:strVal val="#ppt_x"/>
+                                              </p:val>
+                                            </p:tav>
+                                          </p:tavLst>
+                                        </p:anim>
+                                        <p:anim calcmode="lin" valueType="num">
+                                          <p:cBhvr additive="base">
+                                            <p:cTn id="15" dur="500" fill="hold"/>
+                                            <p:tgtEl>
+                                              <p:spTgt spid="4"/>
+                                            </p:tgtEl>
+                                            <p:attrNameLst>
+                                              <p:attrName>ppt_y</p:attrName>
+                                            </p:attrNameLst>
+                                          </p:cBhvr>
+                                          <p:tavLst>
+                                            <p:tav tm="0">
+                                              <p:val>
+                                                <p:strVal val="1+#ppt_h/2"/>
+                                              </p:val>
+                                            </p:tav>
+                                            <p:tav tm="100000">
+                                              <p:val>
+                                                <p:strVal val="#ppt_y"/>
+                                              </p:val>
+                                            </p:tav>
+                                          </p:tavLst>
+                                        </p:anim>
+                                      </p:childTnLst>
+                                    </p:cTn>
+                                  </p:par>
+                                </p:childTnLst>
+                              </p:cTn>
+                            </p:par>
+                          </p:childTnLst>
+                        </p:cTn>
+                      </p:par>
+                    </p:childTnLst>
+                  </p:cTn>
+                  <p:prevCondLst>
+                    <p:cond evt="onPrev" delay="0">
+                      <p:tgtEl>
+                        <p:sldTgt/>
+                      </p:tgtEl>
+                    </p:cond>
+                  </p:prevCondLst>
+                  <p:nextCondLst>
+                    <p:cond evt="onNext" delay="0">
+                      <p:tgtEl>
+                        <p:sldTgt/>
+                      </p:tgtEl>
+                    </p:cond>
+                  </p:nextCondLst>
+                </p:seq>
+              </p:childTnLst>
+            </p:cTn>
+          </p:par>
+        </p:tnLst>
+        <p:bldLst>
+          <p:bldP spid="8" grpId="0" animBg="1"/>
+          <p:bldP spid="9" grpId="0"/>
+        </p:bldLst>
+      </p:timing>
+    </mc:Fallback>
+  </mc:AlternateContent>
+</p:sld>
+</file>
+
+<file path=ppt/slides/slide11.xml><?xml version="1.0" encoding="utf-8"?>
+<p:sld xmlns:a="http://schemas.openxmlformats.org/drawingml/2006/main" xmlns:r="http://schemas.openxmlformats.org/officeDocument/2006/relationships" xmlns:p="http://schemas.openxmlformats.org/presentationml/2006/main">
+  <p:cSld>
+    <p:bg>
+      <p:bgPr>
+        <a:blipFill dpi="0" rotWithShape="1">
+          <a:blip r:embed="rId2">
+            <a:lum/>
+          </a:blip>
+          <a:srcRect/>
+          <a:stretch>
+            <a:fillRect/>
+          </a:stretch>
+        </a:blipFill>
+        <a:effectLst/>
+      </p:bgPr>
+    </p:bg>
+    <p:spTree>
+      <p:nvGrpSpPr>
+        <p:cNvPr id="1" name=""/>
+        <p:cNvGrpSpPr/>
+        <p:nvPr/>
+      </p:nvGrpSpPr>
+      <p:grpSpPr>
+        <a:xfrm>
+          <a:off x="0" y="0"/>
+          <a:ext cx="0" cy="0"/>
+          <a:chOff x="0" y="0"/>
+          <a:chExt cx="0" cy="0"/>
+        </a:xfrm>
+      </p:grpSpPr>
       <p:pic>
         <p:nvPicPr>
           <p:cNvPr id="2" name="Imagem 1"/>
@@ -6449,7 +7092,7 @@
 </p:sld>
 </file>
 
-<file path=ppt/slides/slide11.xml><?xml version="1.0" encoding="utf-8"?>
+<file path=ppt/slides/slide12.xml><?xml version="1.0" encoding="utf-8"?>
 <p:sld xmlns:a="http://schemas.openxmlformats.org/drawingml/2006/main" xmlns:r="http://schemas.openxmlformats.org/officeDocument/2006/relationships" xmlns:p="http://schemas.openxmlformats.org/presentationml/2006/main">
   <p:cSld>
     <p:spTree>
@@ -6515,7 +7158,7 @@
 </p:sld>
 </file>
 
-<file path=ppt/slides/slide12.xml><?xml version="1.0" encoding="utf-8"?>
+<file path=ppt/slides/slide13.xml><?xml version="1.0" encoding="utf-8"?>
 <p:sld xmlns:a="http://schemas.openxmlformats.org/drawingml/2006/main" xmlns:r="http://schemas.openxmlformats.org/officeDocument/2006/relationships" xmlns:p="http://schemas.openxmlformats.org/presentationml/2006/main">
   <p:cSld>
     <p:spTree>
@@ -6582,7 +7225,7 @@
 </p:sld>
 </file>
 
-<file path=ppt/slides/slide13.xml><?xml version="1.0" encoding="utf-8"?>
+<file path=ppt/slides/slide14.xml><?xml version="1.0" encoding="utf-8"?>
 <p:sld xmlns:a="http://schemas.openxmlformats.org/drawingml/2006/main" xmlns:r="http://schemas.openxmlformats.org/officeDocument/2006/relationships" xmlns:p="http://schemas.openxmlformats.org/presentationml/2006/main">
   <p:cSld>
     <p:bg>
@@ -7114,7 +7757,7 @@
 </p:sld>
 </file>
 
-<file path=ppt/slides/slide14.xml><?xml version="1.0" encoding="utf-8"?>
+<file path=ppt/slides/slide15.xml><?xml version="1.0" encoding="utf-8"?>
 <p:sld xmlns:a="http://schemas.openxmlformats.org/drawingml/2006/main" xmlns:r="http://schemas.openxmlformats.org/officeDocument/2006/relationships" xmlns:p="http://schemas.openxmlformats.org/presentationml/2006/main">
   <p:cSld>
     <p:bg>
@@ -7756,7 +8399,7 @@
 </p:sld>
 </file>
 
-<file path=ppt/slides/slide15.xml><?xml version="1.0" encoding="utf-8"?>
+<file path=ppt/slides/slide16.xml><?xml version="1.0" encoding="utf-8"?>
 <p:sld xmlns:a="http://schemas.openxmlformats.org/drawingml/2006/main" xmlns:r="http://schemas.openxmlformats.org/officeDocument/2006/relationships" xmlns:p="http://schemas.openxmlformats.org/presentationml/2006/main">
   <p:cSld>
     <p:bg>

</xml_diff>